<commit_message>
apply softmax before L1; notes
</commit_message>
<xml_diff>
--- a/notes/2024_04_30_notes.pptx
+++ b/notes/2024_04_30_notes.pptx
@@ -261,7 +261,7 @@
           <a:p>
             <a:fld id="{0271FF89-F4DD-4157-942E-E55131F7A6EB}" type="datetimeFigureOut">
               <a:rPr lang="en-US" smtClean="0"/>
-              <a:t>5/1/2024</a:t>
+              <a:t>5/27/2024</a:t>
             </a:fld>
             <a:endParaRPr lang="en-US"/>
           </a:p>
@@ -459,7 +459,7 @@
           <a:p>
             <a:fld id="{0271FF89-F4DD-4157-942E-E55131F7A6EB}" type="datetimeFigureOut">
               <a:rPr lang="en-US" smtClean="0"/>
-              <a:t>5/1/2024</a:t>
+              <a:t>5/27/2024</a:t>
             </a:fld>
             <a:endParaRPr lang="en-US"/>
           </a:p>
@@ -667,7 +667,7 @@
           <a:p>
             <a:fld id="{0271FF89-F4DD-4157-942E-E55131F7A6EB}" type="datetimeFigureOut">
               <a:rPr lang="en-US" smtClean="0"/>
-              <a:t>5/1/2024</a:t>
+              <a:t>5/27/2024</a:t>
             </a:fld>
             <a:endParaRPr lang="en-US"/>
           </a:p>
@@ -865,7 +865,7 @@
           <a:p>
             <a:fld id="{0271FF89-F4DD-4157-942E-E55131F7A6EB}" type="datetimeFigureOut">
               <a:rPr lang="en-US" smtClean="0"/>
-              <a:t>5/1/2024</a:t>
+              <a:t>5/27/2024</a:t>
             </a:fld>
             <a:endParaRPr lang="en-US"/>
           </a:p>
@@ -1140,7 +1140,7 @@
           <a:p>
             <a:fld id="{0271FF89-F4DD-4157-942E-E55131F7A6EB}" type="datetimeFigureOut">
               <a:rPr lang="en-US" smtClean="0"/>
-              <a:t>5/1/2024</a:t>
+              <a:t>5/27/2024</a:t>
             </a:fld>
             <a:endParaRPr lang="en-US"/>
           </a:p>
@@ -1405,7 +1405,7 @@
           <a:p>
             <a:fld id="{0271FF89-F4DD-4157-942E-E55131F7A6EB}" type="datetimeFigureOut">
               <a:rPr lang="en-US" smtClean="0"/>
-              <a:t>5/1/2024</a:t>
+              <a:t>5/27/2024</a:t>
             </a:fld>
             <a:endParaRPr lang="en-US"/>
           </a:p>
@@ -1817,7 +1817,7 @@
           <a:p>
             <a:fld id="{0271FF89-F4DD-4157-942E-E55131F7A6EB}" type="datetimeFigureOut">
               <a:rPr lang="en-US" smtClean="0"/>
-              <a:t>5/1/2024</a:t>
+              <a:t>5/27/2024</a:t>
             </a:fld>
             <a:endParaRPr lang="en-US"/>
           </a:p>
@@ -1958,7 +1958,7 @@
           <a:p>
             <a:fld id="{0271FF89-F4DD-4157-942E-E55131F7A6EB}" type="datetimeFigureOut">
               <a:rPr lang="en-US" smtClean="0"/>
-              <a:t>5/1/2024</a:t>
+              <a:t>5/27/2024</a:t>
             </a:fld>
             <a:endParaRPr lang="en-US"/>
           </a:p>
@@ -2071,7 +2071,7 @@
           <a:p>
             <a:fld id="{0271FF89-F4DD-4157-942E-E55131F7A6EB}" type="datetimeFigureOut">
               <a:rPr lang="en-US" smtClean="0"/>
-              <a:t>5/1/2024</a:t>
+              <a:t>5/27/2024</a:t>
             </a:fld>
             <a:endParaRPr lang="en-US"/>
           </a:p>
@@ -2382,7 +2382,7 @@
           <a:p>
             <a:fld id="{0271FF89-F4DD-4157-942E-E55131F7A6EB}" type="datetimeFigureOut">
               <a:rPr lang="en-US" smtClean="0"/>
-              <a:t>5/1/2024</a:t>
+              <a:t>5/27/2024</a:t>
             </a:fld>
             <a:endParaRPr lang="en-US"/>
           </a:p>
@@ -2670,7 +2670,7 @@
           <a:p>
             <a:fld id="{0271FF89-F4DD-4157-942E-E55131F7A6EB}" type="datetimeFigureOut">
               <a:rPr lang="en-US" smtClean="0"/>
-              <a:t>5/1/2024</a:t>
+              <a:t>5/27/2024</a:t>
             </a:fld>
             <a:endParaRPr lang="en-US"/>
           </a:p>
@@ -2911,7 +2911,7 @@
           <a:p>
             <a:fld id="{0271FF89-F4DD-4157-942E-E55131F7A6EB}" type="datetimeFigureOut">
               <a:rPr lang="en-US" smtClean="0"/>
-              <a:t>5/1/2024</a:t>
+              <a:t>5/27/2024</a:t>
             </a:fld>
             <a:endParaRPr lang="en-US"/>
           </a:p>
@@ -5366,7 +5366,32 @@
           <a:p>
             <a:r>
               <a:rPr lang="en-US" dirty="0"/>
-              <a:t>Loss += L1(p, sample(t).detach())</a:t>
+              <a:t>Loss += L1(</a:t>
+            </a:r>
+            <a:r>
+              <a:rPr lang="en-US" dirty="0" err="1"/>
+              <a:t>p.softmax</a:t>
+            </a:r>
+            <a:r>
+              <a:rPr lang="en-US" dirty="0"/>
+              <a:t>(), sample(t).detach())</a:t>
+            </a:r>
+          </a:p>
+          <a:p>
+            <a:endParaRPr lang="en-US" dirty="0"/>
+          </a:p>
+          <a:p>
+            <a:r>
+              <a:rPr lang="en-US" dirty="0"/>
+              <a:t>Projected GD: interpreter = </a:t>
+            </a:r>
+            <a:r>
+              <a:rPr lang="en-US" dirty="0" err="1"/>
+              <a:t>interpreter.softmax</a:t>
+            </a:r>
+            <a:r>
+              <a:rPr lang="en-US" dirty="0"/>
+              <a:t>() every step</a:t>
             </a:r>
           </a:p>
         </p:txBody>

</xml_diff>

<commit_message>
no more projected GD
</commit_message>
<xml_diff>
--- a/notes/2024_04_30_notes.pptx
+++ b/notes/2024_04_30_notes.pptx
@@ -5374,25 +5374,13 @@
             </a:r>
             <a:r>
               <a:rPr lang="en-US" dirty="0"/>
-              <a:t>(), sample(t).detach())</a:t>
-            </a:r>
-          </a:p>
-          <a:p>
+              <a:t>(), sample(t).</a:t>
+            </a:r>
+            <a:r>
+              <a:rPr lang="en-US"/>
+              <a:t>detach())</a:t>
+            </a:r>
             <a:endParaRPr lang="en-US" dirty="0"/>
-          </a:p>
-          <a:p>
-            <a:r>
-              <a:rPr lang="en-US" dirty="0"/>
-              <a:t>Projected GD: interpreter = </a:t>
-            </a:r>
-            <a:r>
-              <a:rPr lang="en-US" dirty="0" err="1"/>
-              <a:t>interpreter.softmax</a:t>
-            </a:r>
-            <a:r>
-              <a:rPr lang="en-US" dirty="0"/>
-              <a:t>() every step</a:t>
-            </a:r>
           </a:p>
         </p:txBody>
       </p:sp>

</xml_diff>